<commit_message>
HTML background változtatása, PPT fejlesztése
</commit_message>
<xml_diff>
--- a/Bemutató.pptx
+++ b/Bemutató.pptx
@@ -8,6 +8,9 @@
     <p:sldId id="256" r:id="rId2"/>
     <p:sldId id="257" r:id="rId3"/>
     <p:sldId id="258" r:id="rId4"/>
+    <p:sldId id="260" r:id="rId5"/>
+    <p:sldId id="261" r:id="rId6"/>
+    <p:sldId id="259" r:id="rId7"/>
   </p:sldIdLst>
   <p:sldSz cx="12192000" cy="6858000"/>
   <p:notesSz cx="6858000" cy="9144000"/>
@@ -106,6 +109,11 @@
       </a:defRPr>
     </a:lvl9pPr>
   </p:defaultTextStyle>
+  <p:extLst>
+    <p:ext uri="{EFAFB233-063F-42B5-8137-9DF3F51BA10A}">
+      <p15:sldGuideLst xmlns:p15="http://schemas.microsoft.com/office/powerpoint/2012/main"/>
+    </p:ext>
+  </p:extLst>
 </p:presentation>
 </file>
 
@@ -256,7 +264,7 @@
           <a:p>
             <a:fld id="{B978657B-5D32-4E19-A37C-995D2A403FB6}" type="datetimeFigureOut">
               <a:rPr lang="hu-HU" smtClean="0"/>
-              <a:t>2025. 09. 16.</a:t>
+              <a:t>2025. 09. 17.</a:t>
             </a:fld>
             <a:endParaRPr lang="hu-HU"/>
           </a:p>
@@ -454,7 +462,7 @@
           <a:p>
             <a:fld id="{B978657B-5D32-4E19-A37C-995D2A403FB6}" type="datetimeFigureOut">
               <a:rPr lang="hu-HU" smtClean="0"/>
-              <a:t>2025. 09. 16.</a:t>
+              <a:t>2025. 09. 17.</a:t>
             </a:fld>
             <a:endParaRPr lang="hu-HU"/>
           </a:p>
@@ -662,7 +670,7 @@
           <a:p>
             <a:fld id="{B978657B-5D32-4E19-A37C-995D2A403FB6}" type="datetimeFigureOut">
               <a:rPr lang="hu-HU" smtClean="0"/>
-              <a:t>2025. 09. 16.</a:t>
+              <a:t>2025. 09. 17.</a:t>
             </a:fld>
             <a:endParaRPr lang="hu-HU"/>
           </a:p>
@@ -860,7 +868,7 @@
           <a:p>
             <a:fld id="{B978657B-5D32-4E19-A37C-995D2A403FB6}" type="datetimeFigureOut">
               <a:rPr lang="hu-HU" smtClean="0"/>
-              <a:t>2025. 09. 16.</a:t>
+              <a:t>2025. 09. 17.</a:t>
             </a:fld>
             <a:endParaRPr lang="hu-HU"/>
           </a:p>
@@ -1135,7 +1143,7 @@
           <a:p>
             <a:fld id="{B978657B-5D32-4E19-A37C-995D2A403FB6}" type="datetimeFigureOut">
               <a:rPr lang="hu-HU" smtClean="0"/>
-              <a:t>2025. 09. 16.</a:t>
+              <a:t>2025. 09. 17.</a:t>
             </a:fld>
             <a:endParaRPr lang="hu-HU"/>
           </a:p>
@@ -1400,7 +1408,7 @@
           <a:p>
             <a:fld id="{B978657B-5D32-4E19-A37C-995D2A403FB6}" type="datetimeFigureOut">
               <a:rPr lang="hu-HU" smtClean="0"/>
-              <a:t>2025. 09. 16.</a:t>
+              <a:t>2025. 09. 17.</a:t>
             </a:fld>
             <a:endParaRPr lang="hu-HU"/>
           </a:p>
@@ -1812,7 +1820,7 @@
           <a:p>
             <a:fld id="{B978657B-5D32-4E19-A37C-995D2A403FB6}" type="datetimeFigureOut">
               <a:rPr lang="hu-HU" smtClean="0"/>
-              <a:t>2025. 09. 16.</a:t>
+              <a:t>2025. 09. 17.</a:t>
             </a:fld>
             <a:endParaRPr lang="hu-HU"/>
           </a:p>
@@ -1953,7 +1961,7 @@
           <a:p>
             <a:fld id="{B978657B-5D32-4E19-A37C-995D2A403FB6}" type="datetimeFigureOut">
               <a:rPr lang="hu-HU" smtClean="0"/>
-              <a:t>2025. 09. 16.</a:t>
+              <a:t>2025. 09. 17.</a:t>
             </a:fld>
             <a:endParaRPr lang="hu-HU"/>
           </a:p>
@@ -2066,7 +2074,7 @@
           <a:p>
             <a:fld id="{B978657B-5D32-4E19-A37C-995D2A403FB6}" type="datetimeFigureOut">
               <a:rPr lang="hu-HU" smtClean="0"/>
-              <a:t>2025. 09. 16.</a:t>
+              <a:t>2025. 09. 17.</a:t>
             </a:fld>
             <a:endParaRPr lang="hu-HU"/>
           </a:p>
@@ -2377,7 +2385,7 @@
           <a:p>
             <a:fld id="{B978657B-5D32-4E19-A37C-995D2A403FB6}" type="datetimeFigureOut">
               <a:rPr lang="hu-HU" smtClean="0"/>
-              <a:t>2025. 09. 16.</a:t>
+              <a:t>2025. 09. 17.</a:t>
             </a:fld>
             <a:endParaRPr lang="hu-HU"/>
           </a:p>
@@ -2665,7 +2673,7 @@
           <a:p>
             <a:fld id="{B978657B-5D32-4E19-A37C-995D2A403FB6}" type="datetimeFigureOut">
               <a:rPr lang="hu-HU" smtClean="0"/>
-              <a:t>2025. 09. 16.</a:t>
+              <a:t>2025. 09. 17.</a:t>
             </a:fld>
             <a:endParaRPr lang="hu-HU"/>
           </a:p>
@@ -2912,7 +2920,7 @@
           <a:p>
             <a:fld id="{B978657B-5D32-4E19-A37C-995D2A403FB6}" type="datetimeFigureOut">
               <a:rPr lang="hu-HU" smtClean="0"/>
-              <a:t>2025. 09. 16.</a:t>
+              <a:t>2025. 09. 17.</a:t>
             </a:fld>
             <a:endParaRPr lang="hu-HU"/>
           </a:p>
@@ -4091,6 +4099,24 @@
                 </a:solidFill>
                 <a:latin typeface="Bahnschrift" panose="020B0502040204020203" pitchFamily="34" charset="0"/>
               </a:rPr>
+              <a:t> </a:t>
+            </a:r>
+            <a:r>
+              <a:rPr lang="hu-HU" dirty="0" err="1">
+                <a:solidFill>
+                  <a:schemeClr val="bg1"/>
+                </a:solidFill>
+                <a:latin typeface="Bahnschrift" panose="020B0502040204020203" pitchFamily="34" charset="0"/>
+              </a:rPr>
+              <a:t>figmában</a:t>
+            </a:r>
+            <a:r>
+              <a:rPr lang="hu-HU" dirty="0">
+                <a:solidFill>
+                  <a:schemeClr val="bg1"/>
+                </a:solidFill>
+                <a:latin typeface="Bahnschrift" panose="020B0502040204020203" pitchFamily="34" charset="0"/>
+              </a:rPr>
               <a:t>:</a:t>
             </a:r>
           </a:p>
@@ -4132,6 +4158,545 @@
     <p:extLst>
       <p:ext uri="{BB962C8B-B14F-4D97-AF65-F5344CB8AC3E}">
         <p14:creationId xmlns:p14="http://schemas.microsoft.com/office/powerpoint/2010/main" val="1663304663"/>
+      </p:ext>
+    </p:extLst>
+  </p:cSld>
+  <p:clrMapOvr>
+    <a:masterClrMapping/>
+  </p:clrMapOvr>
+</p:sld>
+</file>
+
+<file path=ppt/slides/slide4.xml><?xml version="1.0" encoding="utf-8"?>
+<p:sld xmlns:a="http://schemas.openxmlformats.org/drawingml/2006/main" xmlns:r="http://schemas.openxmlformats.org/officeDocument/2006/relationships" xmlns:p="http://schemas.openxmlformats.org/presentationml/2006/main">
+  <p:cSld>
+    <p:spTree>
+      <p:nvGrpSpPr>
+        <p:cNvPr id="1" name=""/>
+        <p:cNvGrpSpPr/>
+        <p:nvPr/>
+      </p:nvGrpSpPr>
+      <p:grpSpPr>
+        <a:xfrm>
+          <a:off x="0" y="0"/>
+          <a:ext cx="0" cy="0"/>
+          <a:chOff x="0" y="0"/>
+          <a:chExt cx="0" cy="0"/>
+        </a:xfrm>
+      </p:grpSpPr>
+      <p:sp>
+        <p:nvSpPr>
+          <p:cNvPr id="5" name="Téglalap 4">
+            <a:extLst>
+              <a:ext uri="{FF2B5EF4-FFF2-40B4-BE49-F238E27FC236}">
+                <a16:creationId xmlns:a16="http://schemas.microsoft.com/office/drawing/2014/main" id="{6A38864C-504C-4DB8-996A-82ACAD39C46C}"/>
+              </a:ext>
+            </a:extLst>
+          </p:cNvPr>
+          <p:cNvSpPr/>
+          <p:nvPr/>
+        </p:nvSpPr>
+        <p:spPr>
+          <a:xfrm>
+            <a:off x="1017410" y="3566320"/>
+            <a:ext cx="9951154" cy="2451628"/>
+          </a:xfrm>
+          <a:prstGeom prst="rect">
+            <a:avLst/>
+          </a:prstGeom>
+        </p:spPr>
+        <p:style>
+          <a:lnRef idx="2">
+            <a:schemeClr val="accent6"/>
+          </a:lnRef>
+          <a:fillRef idx="1">
+            <a:schemeClr val="lt1"/>
+          </a:fillRef>
+          <a:effectRef idx="0">
+            <a:schemeClr val="accent6"/>
+          </a:effectRef>
+          <a:fontRef idx="minor">
+            <a:schemeClr val="dk1"/>
+          </a:fontRef>
+        </p:style>
+        <p:txBody>
+          <a:bodyPr rtlCol="0" anchor="ctr"/>
+          <a:lstStyle/>
+          <a:p>
+            <a:pPr algn="ctr"/>
+            <a:endParaRPr lang="hu-HU"/>
+          </a:p>
+        </p:txBody>
+      </p:sp>
+      <p:sp>
+        <p:nvSpPr>
+          <p:cNvPr id="2" name="Cím 1">
+            <a:extLst>
+              <a:ext uri="{FF2B5EF4-FFF2-40B4-BE49-F238E27FC236}">
+                <a16:creationId xmlns:a16="http://schemas.microsoft.com/office/drawing/2014/main" id="{8C7FB4E1-412F-404C-AA65-1C45F79B64C9}"/>
+              </a:ext>
+            </a:extLst>
+          </p:cNvPr>
+          <p:cNvSpPr>
+            <a:spLocks noGrp="1"/>
+          </p:cNvSpPr>
+          <p:nvPr>
+            <p:ph type="title"/>
+          </p:nvPr>
+        </p:nvSpPr>
+        <p:spPr>
+          <a:xfrm>
+            <a:off x="149578" y="116769"/>
+            <a:ext cx="10515600" cy="1325563"/>
+          </a:xfrm>
+        </p:spPr>
+        <p:txBody>
+          <a:bodyPr/>
+          <a:lstStyle/>
+          <a:p>
+            <a:r>
+              <a:rPr lang="hu-HU" dirty="0" err="1">
+                <a:solidFill>
+                  <a:schemeClr val="bg1"/>
+                </a:solidFill>
+                <a:latin typeface="Bahnschrift" panose="020B0502040204020203" pitchFamily="34" charset="0"/>
+              </a:rPr>
+              <a:t>Forrásgyújtés</a:t>
+            </a:r>
+            <a:r>
+              <a:rPr lang="hu-HU" dirty="0">
+                <a:solidFill>
+                  <a:schemeClr val="bg1"/>
+                </a:solidFill>
+                <a:latin typeface="Bahnschrift" panose="020B0502040204020203" pitchFamily="34" charset="0"/>
+              </a:rPr>
+              <a:t>:</a:t>
+            </a:r>
+          </a:p>
+        </p:txBody>
+      </p:sp>
+      <p:sp>
+        <p:nvSpPr>
+          <p:cNvPr id="3" name="Tartalom helye 2">
+            <a:extLst>
+              <a:ext uri="{FF2B5EF4-FFF2-40B4-BE49-F238E27FC236}">
+                <a16:creationId xmlns:a16="http://schemas.microsoft.com/office/drawing/2014/main" id="{22764B69-50D1-44C4-86DD-4E2EB9908F47}"/>
+              </a:ext>
+            </a:extLst>
+          </p:cNvPr>
+          <p:cNvSpPr>
+            <a:spLocks noGrp="1"/>
+          </p:cNvSpPr>
+          <p:nvPr>
+            <p:ph idx="1"/>
+          </p:nvPr>
+        </p:nvSpPr>
+        <p:spPr>
+          <a:xfrm>
+            <a:off x="555977" y="1746603"/>
+            <a:ext cx="10515600" cy="4351338"/>
+          </a:xfrm>
+        </p:spPr>
+        <p:txBody>
+          <a:bodyPr/>
+          <a:lstStyle/>
+          <a:p>
+            <a:pPr marL="0" indent="0">
+              <a:buNone/>
+            </a:pPr>
+            <a:r>
+              <a:rPr lang="hu-HU" dirty="0">
+                <a:solidFill>
+                  <a:schemeClr val="bg1"/>
+                </a:solidFill>
+                <a:latin typeface="Bahnschrift" panose="020B0502040204020203" pitchFamily="34" charset="0"/>
+              </a:rPr>
+              <a:t>Minden forrás egy „forras.txt” fájlba gyűjtöttük.</a:t>
+            </a:r>
+          </a:p>
+        </p:txBody>
+      </p:sp>
+      <p:pic>
+        <p:nvPicPr>
+          <p:cNvPr id="4" name="Kép 3">
+            <a:extLst>
+              <a:ext uri="{FF2B5EF4-FFF2-40B4-BE49-F238E27FC236}">
+                <a16:creationId xmlns:a16="http://schemas.microsoft.com/office/drawing/2014/main" id="{77C7FCA9-FBCD-4BE3-B6CD-3D2EBB23D969}"/>
+              </a:ext>
+            </a:extLst>
+          </p:cNvPr>
+          <p:cNvPicPr>
+            <a:picLocks noChangeAspect="1"/>
+          </p:cNvPicPr>
+          <p:nvPr/>
+        </p:nvPicPr>
+        <p:blipFill>
+          <a:blip r:embed="rId2"/>
+          <a:stretch>
+            <a:fillRect/>
+          </a:stretch>
+        </p:blipFill>
+        <p:spPr>
+          <a:xfrm>
+            <a:off x="1111425" y="3644372"/>
+            <a:ext cx="9763125" cy="2295525"/>
+          </a:xfrm>
+          <a:prstGeom prst="rect">
+            <a:avLst/>
+          </a:prstGeom>
+        </p:spPr>
+      </p:pic>
+    </p:spTree>
+    <p:extLst>
+      <p:ext uri="{BB962C8B-B14F-4D97-AF65-F5344CB8AC3E}">
+        <p14:creationId xmlns:p14="http://schemas.microsoft.com/office/powerpoint/2010/main" val="3628119874"/>
+      </p:ext>
+    </p:extLst>
+  </p:cSld>
+  <p:clrMapOvr>
+    <a:masterClrMapping/>
+  </p:clrMapOvr>
+</p:sld>
+</file>
+
+<file path=ppt/slides/slide5.xml><?xml version="1.0" encoding="utf-8"?>
+<p:sld xmlns:a="http://schemas.openxmlformats.org/drawingml/2006/main" xmlns:r="http://schemas.openxmlformats.org/officeDocument/2006/relationships" xmlns:p="http://schemas.openxmlformats.org/presentationml/2006/main">
+  <p:cSld>
+    <p:spTree>
+      <p:nvGrpSpPr>
+        <p:cNvPr id="1" name=""/>
+        <p:cNvGrpSpPr/>
+        <p:nvPr/>
+      </p:nvGrpSpPr>
+      <p:grpSpPr>
+        <a:xfrm>
+          <a:off x="0" y="0"/>
+          <a:ext cx="0" cy="0"/>
+          <a:chOff x="0" y="0"/>
+          <a:chExt cx="0" cy="0"/>
+        </a:xfrm>
+      </p:grpSpPr>
+      <p:sp>
+        <p:nvSpPr>
+          <p:cNvPr id="2" name="Cím 1">
+            <a:extLst>
+              <a:ext uri="{FF2B5EF4-FFF2-40B4-BE49-F238E27FC236}">
+                <a16:creationId xmlns:a16="http://schemas.microsoft.com/office/drawing/2014/main" id="{FFFD5B5A-C948-4C69-B372-B75A2D5A9D08}"/>
+              </a:ext>
+            </a:extLst>
+          </p:cNvPr>
+          <p:cNvSpPr>
+            <a:spLocks noGrp="1"/>
+          </p:cNvSpPr>
+          <p:nvPr>
+            <p:ph type="title"/>
+          </p:nvPr>
+        </p:nvSpPr>
+        <p:spPr>
+          <a:xfrm>
+            <a:off x="0" y="0"/>
+            <a:ext cx="10515600" cy="1325563"/>
+          </a:xfrm>
+        </p:spPr>
+        <p:txBody>
+          <a:bodyPr/>
+          <a:lstStyle/>
+          <a:p>
+            <a:r>
+              <a:rPr lang="hu-HU" dirty="0">
+                <a:solidFill>
+                  <a:schemeClr val="bg1"/>
+                </a:solidFill>
+                <a:latin typeface="Bahnschrift" panose="020B0502040204020203" pitchFamily="34" charset="0"/>
+              </a:rPr>
+              <a:t>Kész főoldal:</a:t>
+            </a:r>
+          </a:p>
+        </p:txBody>
+      </p:sp>
+      <p:pic>
+        <p:nvPicPr>
+          <p:cNvPr id="5" name="Kép 4">
+            <a:extLst>
+              <a:ext uri="{FF2B5EF4-FFF2-40B4-BE49-F238E27FC236}">
+                <a16:creationId xmlns:a16="http://schemas.microsoft.com/office/drawing/2014/main" id="{AC699297-9C1A-4E5C-B4B0-C76F4D51AFDD}"/>
+              </a:ext>
+            </a:extLst>
+          </p:cNvPr>
+          <p:cNvPicPr>
+            <a:picLocks noChangeAspect="1"/>
+          </p:cNvPicPr>
+          <p:nvPr/>
+        </p:nvPicPr>
+        <p:blipFill>
+          <a:blip r:embed="rId2"/>
+          <a:stretch>
+            <a:fillRect/>
+          </a:stretch>
+        </p:blipFill>
+        <p:spPr>
+          <a:xfrm>
+            <a:off x="6096000" y="125946"/>
+            <a:ext cx="5398744" cy="6606107"/>
+          </a:xfrm>
+          <a:prstGeom prst="rect">
+            <a:avLst/>
+          </a:prstGeom>
+        </p:spPr>
+      </p:pic>
+    </p:spTree>
+    <p:extLst>
+      <p:ext uri="{BB962C8B-B14F-4D97-AF65-F5344CB8AC3E}">
+        <p14:creationId xmlns:p14="http://schemas.microsoft.com/office/powerpoint/2010/main" val="3335900353"/>
+      </p:ext>
+    </p:extLst>
+  </p:cSld>
+  <p:clrMapOvr>
+    <a:masterClrMapping/>
+  </p:clrMapOvr>
+</p:sld>
+</file>
+
+<file path=ppt/slides/slide6.xml><?xml version="1.0" encoding="utf-8"?>
+<p:sld xmlns:a="http://schemas.openxmlformats.org/drawingml/2006/main" xmlns:r="http://schemas.openxmlformats.org/officeDocument/2006/relationships" xmlns:p="http://schemas.openxmlformats.org/presentationml/2006/main">
+  <p:cSld>
+    <p:spTree>
+      <p:nvGrpSpPr>
+        <p:cNvPr id="1" name=""/>
+        <p:cNvGrpSpPr/>
+        <p:nvPr/>
+      </p:nvGrpSpPr>
+      <p:grpSpPr>
+        <a:xfrm>
+          <a:off x="0" y="0"/>
+          <a:ext cx="0" cy="0"/>
+          <a:chOff x="0" y="0"/>
+          <a:chExt cx="0" cy="0"/>
+        </a:xfrm>
+      </p:grpSpPr>
+      <p:sp>
+        <p:nvSpPr>
+          <p:cNvPr id="2" name="Cím 1">
+            <a:extLst>
+              <a:ext uri="{FF2B5EF4-FFF2-40B4-BE49-F238E27FC236}">
+                <a16:creationId xmlns:a16="http://schemas.microsoft.com/office/drawing/2014/main" id="{EAFC4D89-ECAA-41B5-85BF-3BF92DE4AB9B}"/>
+              </a:ext>
+            </a:extLst>
+          </p:cNvPr>
+          <p:cNvSpPr>
+            <a:spLocks noGrp="1"/>
+          </p:cNvSpPr>
+          <p:nvPr>
+            <p:ph type="title"/>
+          </p:nvPr>
+        </p:nvSpPr>
+        <p:spPr>
+          <a:xfrm>
+            <a:off x="81845" y="18255"/>
+            <a:ext cx="10515600" cy="1325563"/>
+          </a:xfrm>
+        </p:spPr>
+        <p:txBody>
+          <a:bodyPr/>
+          <a:lstStyle/>
+          <a:p>
+            <a:r>
+              <a:rPr lang="hu-HU" dirty="0">
+                <a:solidFill>
+                  <a:schemeClr val="bg1"/>
+                </a:solidFill>
+                <a:latin typeface="Bahnschrift" panose="020B0502040204020203" pitchFamily="34" charset="0"/>
+              </a:rPr>
+              <a:t>Nehézségek fejlesztés során:</a:t>
+            </a:r>
+          </a:p>
+        </p:txBody>
+      </p:sp>
+      <p:sp>
+        <p:nvSpPr>
+          <p:cNvPr id="3" name="Tartalom helye 2">
+            <a:extLst>
+              <a:ext uri="{FF2B5EF4-FFF2-40B4-BE49-F238E27FC236}">
+                <a16:creationId xmlns:a16="http://schemas.microsoft.com/office/drawing/2014/main" id="{BFF7A904-AAF5-4C6B-B6B9-B0F92FB69180}"/>
+              </a:ext>
+            </a:extLst>
+          </p:cNvPr>
+          <p:cNvSpPr>
+            <a:spLocks noGrp="1"/>
+          </p:cNvSpPr>
+          <p:nvPr>
+            <p:ph idx="1"/>
+          </p:nvPr>
+        </p:nvSpPr>
+        <p:spPr>
+          <a:xfrm>
+            <a:off x="428978" y="2488407"/>
+            <a:ext cx="11334044" cy="4351338"/>
+          </a:xfrm>
+        </p:spPr>
+        <p:txBody>
+          <a:bodyPr/>
+          <a:lstStyle/>
+          <a:p>
+            <a:pPr marL="0" indent="0">
+              <a:buNone/>
+            </a:pPr>
+            <a:r>
+              <a:rPr lang="hu-HU" dirty="0">
+                <a:solidFill>
+                  <a:schemeClr val="bg1"/>
+                </a:solidFill>
+                <a:latin typeface="Bahnschrift" panose="020B0502040204020203" pitchFamily="34" charset="0"/>
+              </a:rPr>
+              <a:t>-A csapatból senki nem ért az autós magazinokhoz, szokatlan terület.</a:t>
+            </a:r>
+          </a:p>
+          <a:p>
+            <a:pPr marL="0" indent="0">
+              <a:buNone/>
+            </a:pPr>
+            <a:endParaRPr lang="hu-HU" dirty="0">
+              <a:solidFill>
+                <a:schemeClr val="bg1"/>
+              </a:solidFill>
+              <a:latin typeface="Bahnschrift" panose="020B0502040204020203" pitchFamily="34" charset="0"/>
+            </a:endParaRPr>
+          </a:p>
+          <a:p>
+            <a:pPr marL="0" indent="0">
+              <a:buNone/>
+            </a:pPr>
+            <a:r>
+              <a:rPr lang="hu-HU" dirty="0">
+                <a:solidFill>
+                  <a:schemeClr val="bg1"/>
+                </a:solidFill>
+                <a:latin typeface="Bahnschrift" panose="020B0502040204020203" pitchFamily="34" charset="0"/>
+              </a:rPr>
+              <a:t>-Szeptember 10: Az eredeti </a:t>
+            </a:r>
+            <a:r>
+              <a:rPr lang="hu-HU" dirty="0" err="1">
+                <a:solidFill>
+                  <a:schemeClr val="bg1"/>
+                </a:solidFill>
+                <a:latin typeface="Bahnschrift" panose="020B0502040204020203" pitchFamily="34" charset="0"/>
+              </a:rPr>
+              <a:t>Git</a:t>
+            </a:r>
+            <a:r>
+              <a:rPr lang="hu-HU" dirty="0">
+                <a:solidFill>
+                  <a:schemeClr val="bg1"/>
+                </a:solidFill>
+                <a:latin typeface="Bahnschrift" panose="020B0502040204020203" pitchFamily="34" charset="0"/>
+              </a:rPr>
+              <a:t> </a:t>
+            </a:r>
+            <a:r>
+              <a:rPr lang="hu-HU" dirty="0" err="1">
+                <a:solidFill>
+                  <a:schemeClr val="bg1"/>
+                </a:solidFill>
+                <a:latin typeface="Bahnschrift" panose="020B0502040204020203" pitchFamily="34" charset="0"/>
+              </a:rPr>
+              <a:t>repository</a:t>
+            </a:r>
+            <a:r>
+              <a:rPr lang="hu-HU" dirty="0">
+                <a:solidFill>
+                  <a:schemeClr val="bg1"/>
+                </a:solidFill>
+                <a:latin typeface="Bahnschrift" panose="020B0502040204020203" pitchFamily="34" charset="0"/>
+              </a:rPr>
+              <a:t> „</a:t>
+            </a:r>
+            <a:r>
+              <a:rPr lang="hu-HU" dirty="0" err="1">
+                <a:solidFill>
+                  <a:schemeClr val="bg1"/>
+                </a:solidFill>
+                <a:latin typeface="Bahnschrift" panose="020B0502040204020203" pitchFamily="34" charset="0"/>
+              </a:rPr>
+              <a:t>Merging</a:t>
+            </a:r>
+            <a:r>
+              <a:rPr lang="hu-HU" dirty="0">
+                <a:solidFill>
+                  <a:schemeClr val="bg1"/>
+                </a:solidFill>
+                <a:latin typeface="Bahnschrift" panose="020B0502040204020203" pitchFamily="34" charset="0"/>
+              </a:rPr>
+              <a:t> </a:t>
+            </a:r>
+            <a:r>
+              <a:rPr lang="hu-HU" dirty="0" err="1">
+                <a:solidFill>
+                  <a:schemeClr val="bg1"/>
+                </a:solidFill>
+                <a:latin typeface="Bahnschrift" panose="020B0502040204020203" pitchFamily="34" charset="0"/>
+              </a:rPr>
+              <a:t>error</a:t>
+            </a:r>
+            <a:r>
+              <a:rPr lang="hu-HU" dirty="0">
+                <a:solidFill>
+                  <a:schemeClr val="bg1"/>
+                </a:solidFill>
+                <a:latin typeface="Bahnschrift" panose="020B0502040204020203" pitchFamily="34" charset="0"/>
+              </a:rPr>
+              <a:t>”-t küldött, nem lehetett feltölteni rá többet, másikra kellett létrehozni</a:t>
+            </a:r>
+          </a:p>
+          <a:p>
+            <a:pPr marL="0" indent="0">
+              <a:buNone/>
+            </a:pPr>
+            <a:endParaRPr lang="hu-HU" dirty="0">
+              <a:solidFill>
+                <a:schemeClr val="bg1"/>
+              </a:solidFill>
+              <a:latin typeface="Bahnschrift" panose="020B0502040204020203" pitchFamily="34" charset="0"/>
+            </a:endParaRPr>
+          </a:p>
+          <a:p>
+            <a:pPr marL="0" indent="0">
+              <a:buNone/>
+            </a:pPr>
+            <a:r>
+              <a:rPr lang="hu-HU" dirty="0">
+                <a:solidFill>
+                  <a:schemeClr val="bg1"/>
+                </a:solidFill>
+                <a:latin typeface="Bahnschrift" panose="020B0502040204020203" pitchFamily="34" charset="0"/>
+              </a:rPr>
+              <a:t>-Szeptember 15: </a:t>
+            </a:r>
+            <a:r>
+              <a:rPr lang="hu-HU" dirty="0" err="1">
+                <a:solidFill>
+                  <a:schemeClr val="bg1"/>
+                </a:solidFill>
+                <a:latin typeface="Bahnschrift" panose="020B0502040204020203" pitchFamily="34" charset="0"/>
+              </a:rPr>
+              <a:t>Staudt</a:t>
+            </a:r>
+            <a:r>
+              <a:rPr lang="hu-HU" dirty="0">
+                <a:solidFill>
+                  <a:schemeClr val="bg1"/>
+                </a:solidFill>
+                <a:latin typeface="Bahnschrift" panose="020B0502040204020203" pitchFamily="34" charset="0"/>
+              </a:rPr>
+              <a:t> István lebetegedett, Tomó Zalánnak kellet az összes munkálatokat átvenni.</a:t>
+            </a:r>
+          </a:p>
+        </p:txBody>
+      </p:sp>
+    </p:spTree>
+    <p:extLst>
+      <p:ext uri="{BB962C8B-B14F-4D97-AF65-F5344CB8AC3E}">
+        <p14:creationId xmlns:p14="http://schemas.microsoft.com/office/powerpoint/2010/main" val="3606076864"/>
       </p:ext>
     </p:extLst>
   </p:cSld>

</xml_diff>